<commit_message>
more updates on the presentation
</commit_message>
<xml_diff>
--- a/First_version_of_the_presentation.pptx
+++ b/First_version_of_the_presentation.pptx
@@ -9,11 +9,11 @@
   </p:notesMasterIdLst>
   <p:sldIdLst>
     <p:sldId id="256" r:id="rId2"/>
-    <p:sldId id="257" r:id="rId3"/>
-    <p:sldId id="258" r:id="rId4"/>
-    <p:sldId id="259" r:id="rId5"/>
-    <p:sldId id="260" r:id="rId6"/>
-    <p:sldId id="261" r:id="rId7"/>
+    <p:sldId id="266" r:id="rId3"/>
+    <p:sldId id="257" r:id="rId4"/>
+    <p:sldId id="265" r:id="rId5"/>
+    <p:sldId id="258" r:id="rId6"/>
+    <p:sldId id="260" r:id="rId7"/>
     <p:sldId id="262" r:id="rId8"/>
     <p:sldId id="263" r:id="rId9"/>
     <p:sldId id="264" r:id="rId10"/>
@@ -22,14 +22,14 @@
   <p:notesSz cx="6858000" cy="9144000"/>
   <p:embeddedFontLst>
     <p:embeddedFont>
-      <p:font typeface="Nunito" charset="0"/>
+      <p:font typeface="Calibri" pitchFamily="34" charset="0"/>
       <p:regular r:id="rId12"/>
       <p:bold r:id="rId13"/>
       <p:italic r:id="rId14"/>
       <p:boldItalic r:id="rId15"/>
     </p:embeddedFont>
     <p:embeddedFont>
-      <p:font typeface="Calibri" pitchFamily="34" charset="0"/>
+      <p:font typeface="Nunito" charset="0"/>
       <p:regular r:id="rId16"/>
       <p:bold r:id="rId17"/>
       <p:italic r:id="rId18"/>
@@ -820,7 +820,7 @@
               </a:spcAft>
               <a:buNone/>
             </a:pPr>
-            <a:endParaRPr/>
+            <a:endParaRPr dirty="0"/>
           </a:p>
         </p:txBody>
       </p:sp>
@@ -833,6 +833,72 @@
 </file>
 
 <file path=ppt/notesSlides/notesSlide2.xml><?xml version="1.0" encoding="utf-8"?>
+<p:notes xmlns:a="http://schemas.openxmlformats.org/drawingml/2006/main" xmlns:r="http://schemas.openxmlformats.org/officeDocument/2006/relationships" xmlns:p="http://schemas.openxmlformats.org/presentationml/2006/main">
+  <p:cSld>
+    <p:spTree>
+      <p:nvGrpSpPr>
+        <p:cNvPr id="1" name=""/>
+        <p:cNvGrpSpPr/>
+        <p:nvPr/>
+      </p:nvGrpSpPr>
+      <p:grpSpPr>
+        <a:xfrm>
+          <a:off x="0" y="0"/>
+          <a:ext cx="0" cy="0"/>
+          <a:chOff x="0" y="0"/>
+          <a:chExt cx="0" cy="0"/>
+        </a:xfrm>
+      </p:grpSpPr>
+      <p:sp>
+        <p:nvSpPr>
+          <p:cNvPr id="2" name="Slide Image Placeholder 1"/>
+          <p:cNvSpPr>
+            <a:spLocks noGrp="1" noRot="1" noChangeAspect="1"/>
+          </p:cNvSpPr>
+          <p:nvPr>
+            <p:ph type="sldImg"/>
+          </p:nvPr>
+        </p:nvSpPr>
+        <p:spPr>
+          <a:xfrm>
+            <a:off x="381000" y="685800"/>
+            <a:ext cx="6096000" cy="3429000"/>
+          </a:xfrm>
+        </p:spPr>
+      </p:sp>
+      <p:sp>
+        <p:nvSpPr>
+          <p:cNvPr id="3" name="Notes Placeholder 2"/>
+          <p:cNvSpPr>
+            <a:spLocks noGrp="1"/>
+          </p:cNvSpPr>
+          <p:nvPr>
+            <p:ph type="body" idx="1"/>
+          </p:nvPr>
+        </p:nvSpPr>
+        <p:spPr/>
+        <p:txBody>
+          <a:bodyPr/>
+          <a:lstStyle/>
+          <a:p>
+            <a:endParaRPr lang="en-US" dirty="0"/>
+          </a:p>
+        </p:txBody>
+      </p:sp>
+    </p:spTree>
+    <p:extLst>
+      <p:ext uri="{BB962C8B-B14F-4D97-AF65-F5344CB8AC3E}">
+        <p14:creationId xmlns:p14="http://schemas.microsoft.com/office/powerpoint/2010/main" val="447964843"/>
+      </p:ext>
+    </p:extLst>
+  </p:cSld>
+  <p:clrMapOvr>
+    <a:masterClrMapping/>
+  </p:clrMapOvr>
+</p:notes>
+</file>
+
+<file path=ppt/notesSlides/notesSlide3.xml><?xml version="1.0" encoding="utf-8"?>
 <p:notes xmlns:a="http://schemas.openxmlformats.org/drawingml/2006/main" xmlns:r="http://schemas.openxmlformats.org/officeDocument/2006/relationships" xmlns:p="http://schemas.openxmlformats.org/presentationml/2006/main" showMasterSp="0" showMasterPhAnim="0">
   <p:cSld>
     <p:spTree>
@@ -861,7 +927,7 @@
         </p:nvSpPr>
         <p:spPr>
           <a:xfrm>
-            <a:off x="381300" y="685800"/>
+            <a:off x="381000" y="685800"/>
             <a:ext cx="6096000" cy="3429000"/>
           </a:xfrm>
           <a:custGeom>
@@ -936,7 +1002,7 @@
 </p:notes>
 </file>
 
-<file path=ppt/notesSlides/notesSlide3.xml><?xml version="1.0" encoding="utf-8"?>
+<file path=ppt/notesSlides/notesSlide4.xml><?xml version="1.0" encoding="utf-8"?>
 <p:notes xmlns:a="http://schemas.openxmlformats.org/drawingml/2006/main" xmlns:r="http://schemas.openxmlformats.org/officeDocument/2006/relationships" xmlns:p="http://schemas.openxmlformats.org/presentationml/2006/main" showMasterSp="0" showMasterPhAnim="0">
   <p:cSld>
     <p:spTree>
@@ -965,7 +1031,7 @@
         </p:nvSpPr>
         <p:spPr>
           <a:xfrm>
-            <a:off x="381300" y="685800"/>
+            <a:off x="381000" y="685800"/>
             <a:ext cx="6096000" cy="3429000"/>
           </a:xfrm>
           <a:custGeom>
@@ -1028,111 +1094,7 @@
               </a:spcAft>
               <a:buNone/>
             </a:pPr>
-            <a:endParaRPr/>
-          </a:p>
-        </p:txBody>
-      </p:sp>
-    </p:spTree>
-  </p:cSld>
-  <p:clrMapOvr>
-    <a:masterClrMapping/>
-  </p:clrMapOvr>
-</p:notes>
-</file>
-
-<file path=ppt/notesSlides/notesSlide4.xml><?xml version="1.0" encoding="utf-8"?>
-<p:notes xmlns:a="http://schemas.openxmlformats.org/drawingml/2006/main" xmlns:r="http://schemas.openxmlformats.org/officeDocument/2006/relationships" xmlns:p="http://schemas.openxmlformats.org/presentationml/2006/main" showMasterSp="0" showMasterPhAnim="0">
-  <p:cSld>
-    <p:spTree>
-      <p:nvGrpSpPr>
-        <p:cNvPr id="1" name="Shape 142"/>
-        <p:cNvGrpSpPr/>
-        <p:nvPr/>
-      </p:nvGrpSpPr>
-      <p:grpSpPr>
-        <a:xfrm>
-          <a:off x="0" y="0"/>
-          <a:ext cx="0" cy="0"/>
-          <a:chOff x="0" y="0"/>
-          <a:chExt cx="0" cy="0"/>
-        </a:xfrm>
-      </p:grpSpPr>
-      <p:sp>
-        <p:nvSpPr>
-          <p:cNvPr id="143" name="Google Shape;143;g57ba081622_0_317:notes"/>
-          <p:cNvSpPr>
-            <a:spLocks noGrp="1" noRot="1" noChangeAspect="1"/>
-          </p:cNvSpPr>
-          <p:nvPr>
-            <p:ph type="sldImg" idx="2"/>
-          </p:nvPr>
-        </p:nvSpPr>
-        <p:spPr>
-          <a:xfrm>
-            <a:off x="381300" y="685800"/>
-            <a:ext cx="6096000" cy="3429000"/>
-          </a:xfrm>
-          <a:custGeom>
-            <a:avLst/>
-            <a:gdLst/>
-            <a:ahLst/>
-            <a:cxnLst/>
-            <a:rect l="l" t="t" r="r" b="b"/>
-            <a:pathLst>
-              <a:path w="120000" h="120000" extrusionOk="0">
-                <a:moveTo>
-                  <a:pt x="0" y="0"/>
-                </a:moveTo>
-                <a:lnTo>
-                  <a:pt x="120000" y="0"/>
-                </a:lnTo>
-                <a:lnTo>
-                  <a:pt x="120000" y="120000"/>
-                </a:lnTo>
-                <a:lnTo>
-                  <a:pt x="0" y="120000"/>
-                </a:lnTo>
-                <a:close/>
-              </a:path>
-            </a:pathLst>
-          </a:custGeom>
-        </p:spPr>
-      </p:sp>
-      <p:sp>
-        <p:nvSpPr>
-          <p:cNvPr id="144" name="Google Shape;144;g57ba081622_0_317:notes"/>
-          <p:cNvSpPr txBox="1">
-            <a:spLocks noGrp="1"/>
-          </p:cNvSpPr>
-          <p:nvPr>
-            <p:ph type="body" idx="1"/>
-          </p:nvPr>
-        </p:nvSpPr>
-        <p:spPr>
-          <a:xfrm>
-            <a:off x="685800" y="4343400"/>
-            <a:ext cx="5486400" cy="4114800"/>
-          </a:xfrm>
-          <a:prstGeom prst="rect">
-            <a:avLst/>
-          </a:prstGeom>
-        </p:spPr>
-        <p:txBody>
-          <a:bodyPr spcFirstLastPara="1" wrap="square" lIns="91425" tIns="91425" rIns="91425" bIns="91425" anchor="t" anchorCtr="0">
-            <a:noAutofit/>
-          </a:bodyPr>
-          <a:lstStyle/>
-          <a:p>
-            <a:pPr marL="0" lvl="0" indent="0" algn="l" rtl="0">
-              <a:spcBef>
-                <a:spcPts val="0"/>
-              </a:spcBef>
-              <a:spcAft>
-                <a:spcPts val="0"/>
-              </a:spcAft>
-              <a:buNone/>
-            </a:pPr>
-            <a:endParaRPr/>
+            <a:endParaRPr dirty="0"/>
           </a:p>
         </p:txBody>
       </p:sp>
@@ -1253,110 +1215,6 @@
   <p:cSld>
     <p:spTree>
       <p:nvGrpSpPr>
-        <p:cNvPr id="1" name="Shape 155"/>
-        <p:cNvGrpSpPr/>
-        <p:nvPr/>
-      </p:nvGrpSpPr>
-      <p:grpSpPr>
-        <a:xfrm>
-          <a:off x="0" y="0"/>
-          <a:ext cx="0" cy="0"/>
-          <a:chOff x="0" y="0"/>
-          <a:chExt cx="0" cy="0"/>
-        </a:xfrm>
-      </p:grpSpPr>
-      <p:sp>
-        <p:nvSpPr>
-          <p:cNvPr id="156" name="Google Shape;156;g57ba081622_0_322:notes"/>
-          <p:cNvSpPr>
-            <a:spLocks noGrp="1" noRot="1" noChangeAspect="1"/>
-          </p:cNvSpPr>
-          <p:nvPr>
-            <p:ph type="sldImg" idx="2"/>
-          </p:nvPr>
-        </p:nvSpPr>
-        <p:spPr>
-          <a:xfrm>
-            <a:off x="381300" y="685800"/>
-            <a:ext cx="6096000" cy="3429000"/>
-          </a:xfrm>
-          <a:custGeom>
-            <a:avLst/>
-            <a:gdLst/>
-            <a:ahLst/>
-            <a:cxnLst/>
-            <a:rect l="l" t="t" r="r" b="b"/>
-            <a:pathLst>
-              <a:path w="120000" h="120000" extrusionOk="0">
-                <a:moveTo>
-                  <a:pt x="0" y="0"/>
-                </a:moveTo>
-                <a:lnTo>
-                  <a:pt x="120000" y="0"/>
-                </a:lnTo>
-                <a:lnTo>
-                  <a:pt x="120000" y="120000"/>
-                </a:lnTo>
-                <a:lnTo>
-                  <a:pt x="0" y="120000"/>
-                </a:lnTo>
-                <a:close/>
-              </a:path>
-            </a:pathLst>
-          </a:custGeom>
-        </p:spPr>
-      </p:sp>
-      <p:sp>
-        <p:nvSpPr>
-          <p:cNvPr id="157" name="Google Shape;157;g57ba081622_0_322:notes"/>
-          <p:cNvSpPr txBox="1">
-            <a:spLocks noGrp="1"/>
-          </p:cNvSpPr>
-          <p:nvPr>
-            <p:ph type="body" idx="1"/>
-          </p:nvPr>
-        </p:nvSpPr>
-        <p:spPr>
-          <a:xfrm>
-            <a:off x="685800" y="4343400"/>
-            <a:ext cx="5486400" cy="4114800"/>
-          </a:xfrm>
-          <a:prstGeom prst="rect">
-            <a:avLst/>
-          </a:prstGeom>
-        </p:spPr>
-        <p:txBody>
-          <a:bodyPr spcFirstLastPara="1" wrap="square" lIns="91425" tIns="91425" rIns="91425" bIns="91425" anchor="t" anchorCtr="0">
-            <a:noAutofit/>
-          </a:bodyPr>
-          <a:lstStyle/>
-          <a:p>
-            <a:pPr marL="0" lvl="0" indent="0" algn="l" rtl="0">
-              <a:spcBef>
-                <a:spcPts val="0"/>
-              </a:spcBef>
-              <a:spcAft>
-                <a:spcPts val="0"/>
-              </a:spcAft>
-              <a:buNone/>
-            </a:pPr>
-            <a:endParaRPr dirty="0"/>
-          </a:p>
-        </p:txBody>
-      </p:sp>
-    </p:spTree>
-  </p:cSld>
-  <p:clrMapOvr>
-    <a:masterClrMapping/>
-  </p:clrMapOvr>
-</p:notes>
-</file>
-
-<file path=ppt/notesSlides/notesSlide7.xml><?xml version="1.0" encoding="utf-8"?>
-<p:notes xmlns:a="http://schemas.openxmlformats.org/drawingml/2006/main" xmlns:r="http://schemas.openxmlformats.org/officeDocument/2006/relationships" xmlns:p="http://schemas.openxmlformats.org/presentationml/2006/main" showMasterSp="0" showMasterPhAnim="0">
-  <p:cSld>
-    <p:spTree>
-      <p:nvGrpSpPr>
         <p:cNvPr id="1" name="Shape 161"/>
         <p:cNvGrpSpPr/>
         <p:nvPr/>
@@ -1456,7 +1314,7 @@
 </p:notes>
 </file>
 
-<file path=ppt/notesSlides/notesSlide8.xml><?xml version="1.0" encoding="utf-8"?>
+<file path=ppt/notesSlides/notesSlide7.xml><?xml version="1.0" encoding="utf-8"?>
 <p:notes xmlns:a="http://schemas.openxmlformats.org/drawingml/2006/main" xmlns:r="http://schemas.openxmlformats.org/officeDocument/2006/relationships" xmlns:p="http://schemas.openxmlformats.org/presentationml/2006/main" showMasterSp="0" showMasterPhAnim="0">
   <p:cSld>
     <p:spTree>
@@ -1560,7 +1418,7 @@
 </p:notes>
 </file>
 
-<file path=ppt/notesSlides/notesSlide9.xml><?xml version="1.0" encoding="utf-8"?>
+<file path=ppt/notesSlides/notesSlide8.xml><?xml version="1.0" encoding="utf-8"?>
 <p:notes xmlns:a="http://schemas.openxmlformats.org/drawingml/2006/main" xmlns:r="http://schemas.openxmlformats.org/officeDocument/2006/relationships" xmlns:p="http://schemas.openxmlformats.org/presentationml/2006/main" showMasterSp="0" showMasterPhAnim="0">
   <p:cSld>
     <p:spTree>
@@ -1589,7 +1447,7 @@
         </p:nvSpPr>
         <p:spPr>
           <a:xfrm>
-            <a:off x="381300" y="685800"/>
+            <a:off x="381000" y="685800"/>
             <a:ext cx="6096000" cy="3429000"/>
           </a:xfrm>
           <a:custGeom>
@@ -9984,6 +9842,159 @@
   <p:cSld>
     <p:spTree>
       <p:nvGrpSpPr>
+        <p:cNvPr id="1" name=""/>
+        <p:cNvGrpSpPr/>
+        <p:nvPr/>
+      </p:nvGrpSpPr>
+      <p:grpSpPr>
+        <a:xfrm>
+          <a:off x="0" y="0"/>
+          <a:ext cx="0" cy="0"/>
+          <a:chOff x="0" y="0"/>
+          <a:chExt cx="0" cy="0"/>
+        </a:xfrm>
+      </p:grpSpPr>
+      <p:sp>
+        <p:nvSpPr>
+          <p:cNvPr id="2" name="Title 1"/>
+          <p:cNvSpPr>
+            <a:spLocks noGrp="1"/>
+          </p:cNvSpPr>
+          <p:nvPr>
+            <p:ph type="ctrTitle"/>
+          </p:nvPr>
+        </p:nvSpPr>
+        <p:spPr>
+          <a:xfrm>
+            <a:off x="1880648" y="952325"/>
+            <a:ext cx="5361300" cy="781378"/>
+          </a:xfrm>
+        </p:spPr>
+        <p:txBody>
+          <a:bodyPr/>
+          <a:lstStyle/>
+          <a:p>
+            <a:r>
+              <a:rPr lang="en-US" dirty="0" smtClean="0"/>
+              <a:t>Overview</a:t>
+            </a:r>
+            <a:endParaRPr lang="en-US" dirty="0"/>
+          </a:p>
+        </p:txBody>
+      </p:sp>
+      <p:sp>
+        <p:nvSpPr>
+          <p:cNvPr id="3" name="Subtitle 2"/>
+          <p:cNvSpPr>
+            <a:spLocks noGrp="1"/>
+          </p:cNvSpPr>
+          <p:nvPr>
+            <p:ph type="subTitle" idx="1"/>
+          </p:nvPr>
+        </p:nvSpPr>
+        <p:spPr>
+          <a:xfrm>
+            <a:off x="1163117" y="1960474"/>
+            <a:ext cx="7439558" cy="1975284"/>
+          </a:xfrm>
+        </p:spPr>
+        <p:txBody>
+          <a:bodyPr/>
+          <a:lstStyle/>
+          <a:p>
+            <a:pPr marL="488950" indent="-342900" algn="just">
+              <a:buFont typeface="+mj-lt"/>
+              <a:buAutoNum type="alphaLcPeriod"/>
+            </a:pPr>
+            <a:r>
+              <a:rPr lang="en" dirty="0" smtClean="0"/>
+              <a:t>Problem statement</a:t>
+            </a:r>
+          </a:p>
+          <a:p>
+            <a:pPr marL="488950" indent="-342900" algn="just">
+              <a:buFont typeface="+mj-lt"/>
+              <a:buAutoNum type="alphaLcPeriod"/>
+            </a:pPr>
+            <a:r>
+              <a:rPr lang="en-US" dirty="0" smtClean="0"/>
+              <a:t>Project goal</a:t>
+            </a:r>
+          </a:p>
+          <a:p>
+            <a:pPr marL="488950" indent="-342900" algn="just">
+              <a:buFont typeface="+mj-lt"/>
+              <a:buAutoNum type="alphaLcPeriod"/>
+            </a:pPr>
+            <a:r>
+              <a:rPr lang="en-US" dirty="0" smtClean="0"/>
+              <a:t>Project </a:t>
+            </a:r>
+            <a:r>
+              <a:rPr lang="en-US" dirty="0" smtClean="0"/>
+              <a:t>deliverables</a:t>
+            </a:r>
+          </a:p>
+          <a:p>
+            <a:pPr marL="488950" indent="-342900" algn="just">
+              <a:buFont typeface="+mj-lt"/>
+              <a:buAutoNum type="alphaLcPeriod"/>
+            </a:pPr>
+            <a:r>
+              <a:rPr lang="en-US" dirty="0"/>
+              <a:t>Our processes so </a:t>
+            </a:r>
+            <a:r>
+              <a:rPr lang="en-US" dirty="0" smtClean="0"/>
+              <a:t>far</a:t>
+            </a:r>
+            <a:endParaRPr lang="en-US" dirty="0" smtClean="0"/>
+          </a:p>
+          <a:p>
+            <a:pPr marL="488950" indent="-342900" algn="just">
+              <a:buFont typeface="+mj-lt"/>
+              <a:buAutoNum type="alphaLcPeriod"/>
+            </a:pPr>
+            <a:r>
+              <a:rPr lang="en-US" dirty="0" smtClean="0"/>
+              <a:t>Proof of concepts</a:t>
+            </a:r>
+          </a:p>
+          <a:p>
+            <a:pPr marL="488950" indent="-342900" algn="just">
+              <a:buFont typeface="+mj-lt"/>
+              <a:buAutoNum type="alphaLcPeriod"/>
+            </a:pPr>
+            <a:r>
+              <a:rPr lang="en-US" dirty="0" smtClean="0"/>
+              <a:t>Our </a:t>
+            </a:r>
+            <a:r>
+              <a:rPr lang="en-US" dirty="0" smtClean="0"/>
+              <a:t>plans for the remaining weeks</a:t>
+            </a:r>
+            <a:endParaRPr lang="en-US" dirty="0"/>
+          </a:p>
+        </p:txBody>
+      </p:sp>
+    </p:spTree>
+    <p:extLst>
+      <p:ext uri="{BB962C8B-B14F-4D97-AF65-F5344CB8AC3E}">
+        <p14:creationId xmlns:p14="http://schemas.microsoft.com/office/powerpoint/2010/main" val="3683450624"/>
+      </p:ext>
+    </p:extLst>
+  </p:cSld>
+  <p:clrMapOvr>
+    <a:masterClrMapping/>
+  </p:clrMapOvr>
+</p:sld>
+</file>
+
+<file path=ppt/slides/slide3.xml><?xml version="1.0" encoding="utf-8"?>
+<p:sld xmlns:a="http://schemas.openxmlformats.org/drawingml/2006/main" xmlns:r="http://schemas.openxmlformats.org/officeDocument/2006/relationships" xmlns:p="http://schemas.openxmlformats.org/presentationml/2006/main">
+  <p:cSld>
+    <p:spTree>
+      <p:nvGrpSpPr>
         <p:cNvPr id="1" name="Shape 133"/>
         <p:cNvGrpSpPr/>
         <p:nvPr/>
@@ -10021,20 +10032,11 @@
           </a:bodyPr>
           <a:lstStyle/>
           <a:p>
-            <a:pPr marL="0" lvl="0" indent="0" algn="ctr" rtl="0">
-              <a:spcBef>
-                <a:spcPts val="0"/>
-              </a:spcBef>
-              <a:spcAft>
-                <a:spcPts val="0"/>
-              </a:spcAft>
-              <a:buNone/>
-            </a:pPr>
+            <a:pPr marL="488950" indent="-342900"/>
             <a:r>
-              <a:rPr lang="en"/>
-              <a:t>Our proof of concept </a:t>
+              <a:rPr lang="en" dirty="0"/>
+              <a:t>Problem statement</a:t>
             </a:r>
-            <a:endParaRPr/>
           </a:p>
         </p:txBody>
       </p:sp>
@@ -10065,7 +10067,7 @@
           <a:p>
             <a:pPr marL="0" lvl="0" indent="0" algn="l" rtl="0">
               <a:spcBef>
-                <a:spcPts val="0"/>
+                <a:spcPts val="1600"/>
               </a:spcBef>
               <a:spcAft>
                 <a:spcPts val="0"/>
@@ -10073,34 +10075,22 @@
               <a:buNone/>
             </a:pPr>
             <a:r>
-              <a:rPr lang="en"/>
-              <a:t>Introduction:</a:t>
-            </a:r>
-            <a:endParaRPr sz="1600" b="1">
-              <a:solidFill>
-                <a:srgbClr val="1F4E79"/>
-              </a:solidFill>
-            </a:endParaRPr>
-          </a:p>
-          <a:p>
-            <a:pPr marL="0" lvl="0" indent="0" algn="l" rtl="0">
-              <a:spcBef>
-                <a:spcPts val="1600"/>
-              </a:spcBef>
-              <a:spcAft>
-                <a:spcPts val="0"/>
-              </a:spcAft>
-              <a:buNone/>
-            </a:pPr>
-            <a:r>
-              <a:rPr lang="en" sz="1100">
+              <a:rPr lang="en" sz="1100" dirty="0" smtClean="0">
                 <a:solidFill>
                   <a:srgbClr val="000000"/>
                 </a:solidFill>
               </a:rPr>
-              <a:t>SIM Software Inc is one of the leading software companies in the Netherland with it headquarters In Eindhoven.</a:t>
+              <a:t>SIM </a:t>
             </a:r>
-            <a:endParaRPr sz="1100">
+            <a:r>
+              <a:rPr lang="en" sz="1100" dirty="0">
+                <a:solidFill>
+                  <a:srgbClr val="000000"/>
+                </a:solidFill>
+              </a:rPr>
+              <a:t>Software Inc is one of the leading software companies in the Netherland with it headquarters In Eindhoven.</a:t>
+            </a:r>
+            <a:endParaRPr sz="1100" dirty="0">
               <a:solidFill>
                 <a:srgbClr val="000000"/>
               </a:solidFill>
@@ -10120,14 +10110,14 @@
               <a:buNone/>
             </a:pPr>
             <a:r>
-              <a:rPr lang="en" sz="1100">
+              <a:rPr lang="en" sz="1100" dirty="0">
                 <a:solidFill>
                   <a:srgbClr val="000000"/>
                 </a:solidFill>
               </a:rPr>
               <a:t>The  company director and his team asked us to develop  a city traffic simulation applications.</a:t>
             </a:r>
-            <a:endParaRPr sz="1100">
+            <a:endParaRPr sz="1100" dirty="0">
               <a:solidFill>
                 <a:srgbClr val="000000"/>
               </a:solidFill>
@@ -10143,7 +10133,7 @@
               </a:spcAft>
               <a:buNone/>
             </a:pPr>
-            <a:endParaRPr/>
+            <a:endParaRPr dirty="0"/>
           </a:p>
           <a:p>
             <a:pPr marL="0" lvl="0" indent="0" algn="l" rtl="0">
@@ -10155,7 +10145,7 @@
               </a:spcAft>
               <a:buNone/>
             </a:pPr>
-            <a:endParaRPr/>
+            <a:endParaRPr dirty="0"/>
           </a:p>
           <a:p>
             <a:pPr marL="0" lvl="0" indent="0" algn="l" rtl="0">
@@ -10167,7 +10157,7 @@
               </a:spcAft>
               <a:buNone/>
             </a:pPr>
-            <a:endParaRPr/>
+            <a:endParaRPr dirty="0" smtClean="0"/>
           </a:p>
           <a:p>
             <a:pPr marL="0" lvl="0" indent="0" algn="l" rtl="0">
@@ -10179,7 +10169,7 @@
               </a:spcAft>
               <a:buNone/>
             </a:pPr>
-            <a:endParaRPr/>
+            <a:endParaRPr dirty="0"/>
           </a:p>
           <a:p>
             <a:pPr marL="0" lvl="0" indent="0" algn="l" rtl="0">
@@ -10191,7 +10181,7 @@
               </a:spcAft>
               <a:buNone/>
             </a:pPr>
-            <a:endParaRPr/>
+            <a:endParaRPr dirty="0"/>
           </a:p>
           <a:p>
             <a:pPr marL="0" lvl="0" indent="0" algn="l" rtl="0">
@@ -10199,183 +10189,11 @@
                 <a:spcPts val="1600"/>
               </a:spcBef>
               <a:spcAft>
-                <a:spcPts val="0"/>
+                <a:spcPts val="1600"/>
               </a:spcAft>
               <a:buNone/>
             </a:pPr>
-            <a:endParaRPr/>
-          </a:p>
-          <a:p>
-            <a:pPr marL="0" lvl="0" indent="0" algn="l" rtl="0">
-              <a:spcBef>
-                <a:spcPts val="1600"/>
-              </a:spcBef>
-              <a:spcAft>
-                <a:spcPts val="0"/>
-              </a:spcAft>
-              <a:buNone/>
-            </a:pPr>
-            <a:endParaRPr/>
-          </a:p>
-          <a:p>
-            <a:pPr marL="0" lvl="0" indent="0" algn="l" rtl="0">
-              <a:spcBef>
-                <a:spcPts val="1600"/>
-              </a:spcBef>
-              <a:spcAft>
-                <a:spcPts val="0"/>
-              </a:spcAft>
-              <a:buNone/>
-            </a:pPr>
-            <a:endParaRPr/>
-          </a:p>
-          <a:p>
-            <a:pPr marL="0" lvl="0" indent="0" algn="l" rtl="0">
-              <a:spcBef>
-                <a:spcPts val="1600"/>
-              </a:spcBef>
-              <a:spcAft>
-                <a:spcPts val="0"/>
-              </a:spcAft>
-              <a:buNone/>
-            </a:pPr>
-            <a:endParaRPr/>
-          </a:p>
-          <a:p>
-            <a:pPr marL="0" lvl="0" indent="0" algn="l" rtl="0">
-              <a:spcBef>
-                <a:spcPts val="1600"/>
-              </a:spcBef>
-              <a:spcAft>
-                <a:spcPts val="0"/>
-              </a:spcAft>
-              <a:buNone/>
-            </a:pPr>
-            <a:endParaRPr/>
-          </a:p>
-          <a:p>
-            <a:pPr marL="0" lvl="0" indent="0" algn="l" rtl="0">
-              <a:spcBef>
-                <a:spcPts val="1600"/>
-              </a:spcBef>
-              <a:spcAft>
-                <a:spcPts val="0"/>
-              </a:spcAft>
-              <a:buNone/>
-            </a:pPr>
-            <a:endParaRPr/>
-          </a:p>
-          <a:p>
-            <a:pPr marL="0" lvl="0" indent="0" algn="l" rtl="0">
-              <a:spcBef>
-                <a:spcPts val="1600"/>
-              </a:spcBef>
-              <a:spcAft>
-                <a:spcPts val="0"/>
-              </a:spcAft>
-              <a:buNone/>
-            </a:pPr>
-            <a:endParaRPr/>
-          </a:p>
-          <a:p>
-            <a:pPr marL="0" lvl="0" indent="0" algn="l" rtl="0">
-              <a:spcBef>
-                <a:spcPts val="1600"/>
-              </a:spcBef>
-              <a:spcAft>
-                <a:spcPts val="0"/>
-              </a:spcAft>
-              <a:buNone/>
-            </a:pPr>
-            <a:endParaRPr/>
-          </a:p>
-          <a:p>
-            <a:pPr marL="0" lvl="0" indent="0" algn="l" rtl="0">
-              <a:spcBef>
-                <a:spcPts val="1600"/>
-              </a:spcBef>
-              <a:spcAft>
-                <a:spcPts val="0"/>
-              </a:spcAft>
-              <a:buNone/>
-            </a:pPr>
-            <a:endParaRPr/>
-          </a:p>
-          <a:p>
-            <a:pPr marL="0" lvl="0" indent="0" algn="l" rtl="0">
-              <a:spcBef>
-                <a:spcPts val="1600"/>
-              </a:spcBef>
-              <a:spcAft>
-                <a:spcPts val="0"/>
-              </a:spcAft>
-              <a:buNone/>
-            </a:pPr>
-            <a:endParaRPr/>
-          </a:p>
-          <a:p>
-            <a:pPr marL="0" lvl="0" indent="0" algn="l" rtl="0">
-              <a:spcBef>
-                <a:spcPts val="1600"/>
-              </a:spcBef>
-              <a:spcAft>
-                <a:spcPts val="0"/>
-              </a:spcAft>
-              <a:buNone/>
-            </a:pPr>
-            <a:endParaRPr/>
-          </a:p>
-          <a:p>
-            <a:pPr marL="0" lvl="0" indent="0" algn="l" rtl="0">
-              <a:spcBef>
-                <a:spcPts val="1600"/>
-              </a:spcBef>
-              <a:spcAft>
-                <a:spcPts val="0"/>
-              </a:spcAft>
-              <a:buNone/>
-            </a:pPr>
-            <a:r>
-              <a:rPr lang="en"/>
-              <a:t>Project goal </a:t>
-            </a:r>
-            <a:endParaRPr/>
-          </a:p>
-          <a:p>
-            <a:pPr marL="0" lvl="0" indent="0" algn="l" rtl="0">
-              <a:spcBef>
-                <a:spcPts val="1600"/>
-              </a:spcBef>
-              <a:spcAft>
-                <a:spcPts val="0"/>
-              </a:spcAft>
-              <a:buNone/>
-            </a:pPr>
-            <a:endParaRPr/>
-          </a:p>
-          <a:p>
-            <a:pPr marL="0" lvl="0" indent="0" algn="l" rtl="0">
-              <a:spcBef>
-                <a:spcPts val="1600"/>
-              </a:spcBef>
-              <a:spcAft>
-                <a:spcPts val="0"/>
-              </a:spcAft>
-              <a:buNone/>
-            </a:pPr>
-            <a:endParaRPr/>
-          </a:p>
-          <a:p>
-            <a:pPr marL="0" lvl="0" indent="0" algn="l" rtl="0">
-              <a:spcBef>
-                <a:spcPts val="1600"/>
-              </a:spcBef>
-              <a:spcAft>
-                <a:spcPts val="1600"/>
-              </a:spcAft>
-              <a:buNone/>
-            </a:pPr>
-            <a:endParaRPr/>
+            <a:endParaRPr dirty="0"/>
           </a:p>
         </p:txBody>
       </p:sp>
@@ -10387,7 +10205,184 @@
 </p:sld>
 </file>
 
-<file path=ppt/slides/slide3.xml><?xml version="1.0" encoding="utf-8"?>
+<file path=ppt/slides/slide4.xml><?xml version="1.0" encoding="utf-8"?>
+<p:sld xmlns:a="http://schemas.openxmlformats.org/drawingml/2006/main" xmlns:r="http://schemas.openxmlformats.org/officeDocument/2006/relationships" xmlns:p="http://schemas.openxmlformats.org/presentationml/2006/main">
+  <p:cSld>
+    <p:spTree>
+      <p:nvGrpSpPr>
+        <p:cNvPr id="1" name=""/>
+        <p:cNvGrpSpPr/>
+        <p:nvPr/>
+      </p:nvGrpSpPr>
+      <p:grpSpPr>
+        <a:xfrm>
+          <a:off x="0" y="0"/>
+          <a:ext cx="0" cy="0"/>
+          <a:chOff x="0" y="0"/>
+          <a:chExt cx="0" cy="0"/>
+        </a:xfrm>
+      </p:grpSpPr>
+      <p:sp>
+        <p:nvSpPr>
+          <p:cNvPr id="2" name="Title 1"/>
+          <p:cNvSpPr>
+            <a:spLocks noGrp="1"/>
+          </p:cNvSpPr>
+          <p:nvPr>
+            <p:ph type="ctrTitle"/>
+          </p:nvPr>
+        </p:nvSpPr>
+        <p:spPr>
+          <a:xfrm>
+            <a:off x="1873334" y="1062053"/>
+            <a:ext cx="5361300" cy="730171"/>
+          </a:xfrm>
+        </p:spPr>
+        <p:txBody>
+          <a:bodyPr/>
+          <a:lstStyle/>
+          <a:p>
+            <a:r>
+              <a:rPr lang="en-US" sz="4000" dirty="0"/>
+              <a:t>Project goal</a:t>
+            </a:r>
+            <a:endParaRPr lang="en-US" dirty="0"/>
+          </a:p>
+        </p:txBody>
+      </p:sp>
+      <p:sp>
+        <p:nvSpPr>
+          <p:cNvPr id="3" name="Subtitle 2"/>
+          <p:cNvSpPr>
+            <a:spLocks noGrp="1"/>
+          </p:cNvSpPr>
+          <p:nvPr>
+            <p:ph type="subTitle" idx="1"/>
+          </p:nvPr>
+        </p:nvSpPr>
+        <p:spPr>
+          <a:xfrm>
+            <a:off x="811987" y="1894637"/>
+            <a:ext cx="7615123" cy="2421331"/>
+          </a:xfrm>
+        </p:spPr>
+        <p:txBody>
+          <a:bodyPr/>
+          <a:lstStyle/>
+          <a:p>
+            <a:pPr marL="0" lvl="0" indent="0" algn="l">
+              <a:lnSpc>
+                <a:spcPct val="115000"/>
+              </a:lnSpc>
+            </a:pPr>
+            <a:r>
+              <a:rPr lang="en-US" dirty="0">
+                <a:solidFill>
+                  <a:srgbClr val="000000"/>
+                </a:solidFill>
+              </a:rPr>
+              <a:t>Our goal is to develop / create a software solution for SIM Software Inc. This software package should be able to</a:t>
+            </a:r>
+          </a:p>
+          <a:p>
+            <a:pPr lvl="0" indent="-298450" algn="l">
+              <a:lnSpc>
+                <a:spcPct val="115000"/>
+              </a:lnSpc>
+              <a:spcBef>
+                <a:spcPts val="1000"/>
+              </a:spcBef>
+              <a:buClr>
+                <a:srgbClr val="000000"/>
+              </a:buClr>
+              <a:buSzPts val="1100"/>
+              <a:buAutoNum type="arabicPeriod"/>
+            </a:pPr>
+            <a:r>
+              <a:rPr lang="en-US" dirty="0">
+                <a:solidFill>
+                  <a:srgbClr val="000000"/>
+                </a:solidFill>
+              </a:rPr>
+              <a:t>Configure the roads and crossings in a city to simulate traffic and pedestrian flow.</a:t>
+            </a:r>
+          </a:p>
+          <a:p>
+            <a:pPr lvl="0" indent="-298450" algn="l">
+              <a:lnSpc>
+                <a:spcPct val="115000"/>
+              </a:lnSpc>
+              <a:spcBef>
+                <a:spcPts val="1000"/>
+              </a:spcBef>
+              <a:buClr>
+                <a:srgbClr val="000000"/>
+              </a:buClr>
+              <a:buSzPts val="1100"/>
+              <a:buAutoNum type="arabicPeriod"/>
+            </a:pPr>
+            <a:r>
+              <a:rPr lang="en-US" dirty="0">
+                <a:solidFill>
+                  <a:srgbClr val="000000"/>
+                </a:solidFill>
+              </a:rPr>
+              <a:t>The simulation provides the means to optimize the configuration of roads, crossings and traffic lights via statistics related to how the traffic resolves.  </a:t>
+            </a:r>
+          </a:p>
+          <a:p>
+            <a:pPr lvl="0" indent="-298450" algn="l">
+              <a:lnSpc>
+                <a:spcPct val="115000"/>
+              </a:lnSpc>
+              <a:spcBef>
+                <a:spcPts val="1000"/>
+              </a:spcBef>
+              <a:buClr>
+                <a:srgbClr val="000000"/>
+              </a:buClr>
+              <a:buSzPts val="1100"/>
+              <a:buAutoNum type="arabicPeriod"/>
+            </a:pPr>
+            <a:r>
+              <a:rPr lang="en-US" dirty="0">
+                <a:solidFill>
+                  <a:srgbClr val="000000"/>
+                </a:solidFill>
+              </a:rPr>
+              <a:t>It should be possible to store simulation models and results in a file or database, and -load previously stored models and results from that file or database.</a:t>
+            </a:r>
+          </a:p>
+          <a:p>
+            <a:pPr marL="0" lvl="0" indent="0" algn="l">
+              <a:spcBef>
+                <a:spcPts val="1000"/>
+              </a:spcBef>
+              <a:spcAft>
+                <a:spcPts val="1600"/>
+              </a:spcAft>
+            </a:pPr>
+            <a:endParaRPr lang="en-US" dirty="0"/>
+          </a:p>
+          <a:p>
+            <a:endParaRPr lang="en-US" dirty="0"/>
+          </a:p>
+        </p:txBody>
+      </p:sp>
+    </p:spTree>
+    <p:extLst>
+      <p:ext uri="{BB962C8B-B14F-4D97-AF65-F5344CB8AC3E}">
+        <p14:creationId xmlns:p14="http://schemas.microsoft.com/office/powerpoint/2010/main" val="1215713857"/>
+      </p:ext>
+    </p:extLst>
+  </p:cSld>
+  <p:clrMapOvr>
+    <a:masterClrMapping/>
+  </p:clrMapOvr>
+</p:sld>
+</file>
+
+<file path=ppt/slides/slide5.xml><?xml version="1.0" encoding="utf-8"?>
 <p:sld xmlns:a="http://schemas.openxmlformats.org/drawingml/2006/main" xmlns:r="http://schemas.openxmlformats.org/officeDocument/2006/relationships" xmlns:p="http://schemas.openxmlformats.org/presentationml/2006/main">
   <p:cSld>
     <p:spTree>
@@ -10429,31 +10424,11 @@
           </a:bodyPr>
           <a:lstStyle/>
           <a:p>
-            <a:pPr marL="0" lvl="0" indent="0" algn="ctr" rtl="0">
-              <a:lnSpc>
-                <a:spcPct val="115000"/>
-              </a:lnSpc>
-              <a:spcBef>
-                <a:spcPts val="0"/>
-              </a:spcBef>
-              <a:spcAft>
-                <a:spcPts val="1000"/>
-              </a:spcAft>
-              <a:buNone/>
-            </a:pPr>
+            <a:pPr marL="488950" indent="-342900"/>
             <a:r>
-              <a:rPr lang="en" sz="1800" b="1">
-                <a:solidFill>
-                  <a:srgbClr val="000000"/>
-                </a:solidFill>
-                <a:latin typeface="Calibri"/>
-                <a:ea typeface="Calibri"/>
-                <a:cs typeface="Calibri"/>
-                <a:sym typeface="Calibri"/>
-              </a:rPr>
-              <a:t>Our goal </a:t>
+              <a:rPr lang="en-US" sz="1800" dirty="0"/>
+              <a:t>Project deliverables</a:t>
             </a:r>
-            <a:endParaRPr sz="1800" b="1"/>
           </a:p>
         </p:txBody>
       </p:sp>
@@ -10482,124 +10457,63 @@
           </a:bodyPr>
           <a:lstStyle/>
           <a:p>
-            <a:pPr marL="0" lvl="0" indent="0" algn="l" rtl="0">
-              <a:lnSpc>
-                <a:spcPct val="115000"/>
-              </a:lnSpc>
-              <a:spcBef>
-                <a:spcPts val="0"/>
-              </a:spcBef>
-              <a:spcAft>
-                <a:spcPts val="0"/>
-              </a:spcAft>
+            <a:pPr marL="0" lvl="0" indent="0" algn="ctr">
+              <a:spcBef>
+                <a:spcPts val="1000"/>
+              </a:spcBef>
               <a:buNone/>
             </a:pPr>
             <a:r>
-              <a:rPr lang="en" sz="1100">
+              <a:rPr lang="en-US" sz="2400" dirty="0">
+                <a:solidFill>
+                  <a:srgbClr val="5B9BD5"/>
+                </a:solidFill>
+              </a:rPr>
+              <a:t>At the end of this project we are expected to deliver</a:t>
+            </a:r>
+          </a:p>
+          <a:p>
+            <a:pPr marL="228600" lvl="0" indent="-298450">
+              <a:buClr>
+                <a:srgbClr val="000000"/>
+              </a:buClr>
+              <a:buSzPts val="1100"/>
+              <a:buFont typeface="Noto Sans Symbols"/>
+              <a:buChar char="●"/>
+            </a:pPr>
+            <a:r>
+              <a:rPr lang="en-US" sz="1400" dirty="0">
                 <a:solidFill>
                   <a:srgbClr val="000000"/>
                 </a:solidFill>
               </a:rPr>
-              <a:t>Our goal is to develop / create a software solution for SIM Software Inc. This software package should be able to</a:t>
+              <a:t>A working application (simulation software) in accordance with the project goals</a:t>
             </a:r>
-            <a:endParaRPr sz="1100">
-              <a:solidFill>
-                <a:srgbClr val="000000"/>
-              </a:solidFill>
-            </a:endParaRPr>
           </a:p>
           <a:p>
-            <a:pPr marL="457200" lvl="0" indent="-298450" algn="l" rtl="0">
-              <a:lnSpc>
-                <a:spcPct val="115000"/>
-              </a:lnSpc>
+            <a:pPr marL="228600" lvl="0" indent="-298450">
               <a:spcBef>
                 <a:spcPts val="1000"/>
               </a:spcBef>
               <a:spcAft>
-                <a:spcPts val="0"/>
+                <a:spcPts val="1000"/>
               </a:spcAft>
               <a:buClr>
                 <a:srgbClr val="000000"/>
               </a:buClr>
               <a:buSzPts val="1100"/>
-              <a:buAutoNum type="arabicPeriod"/>
+              <a:buFont typeface="Noto Sans Symbols"/>
+              <a:buChar char="●"/>
             </a:pPr>
             <a:r>
-              <a:rPr lang="en" sz="1100">
+              <a:rPr lang="en-US" sz="1400" dirty="0">
                 <a:solidFill>
                   <a:srgbClr val="000000"/>
                 </a:solidFill>
               </a:rPr>
-              <a:t>Configure the roads and crossings in a city to simulate traffic and pedestrian flow.</a:t>
+              <a:t>Documents that contains information about the requirements, the design of the system and the process.</a:t>
             </a:r>
-            <a:endParaRPr sz="1100">
-              <a:solidFill>
-                <a:srgbClr val="000000"/>
-              </a:solidFill>
-            </a:endParaRPr>
-          </a:p>
-          <a:p>
-            <a:pPr marL="457200" lvl="0" indent="-298450" algn="l" rtl="0">
-              <a:lnSpc>
-                <a:spcPct val="115000"/>
-              </a:lnSpc>
-              <a:spcBef>
-                <a:spcPts val="1000"/>
-              </a:spcBef>
-              <a:spcAft>
-                <a:spcPts val="0"/>
-              </a:spcAft>
-              <a:buClr>
-                <a:srgbClr val="000000"/>
-              </a:buClr>
-              <a:buSzPts val="1100"/>
-              <a:buAutoNum type="arabicPeriod"/>
-            </a:pPr>
-            <a:r>
-              <a:rPr lang="en" sz="1100">
-                <a:solidFill>
-                  <a:srgbClr val="000000"/>
-                </a:solidFill>
-              </a:rPr>
-              <a:t>The simulation provides the means to optimize the configuration of roads, crossings and traffic lights via statistics related to how the traffic resolves.  </a:t>
-            </a:r>
-            <a:endParaRPr sz="1100">
-              <a:solidFill>
-                <a:srgbClr val="000000"/>
-              </a:solidFill>
-            </a:endParaRPr>
-          </a:p>
-          <a:p>
-            <a:pPr marL="457200" lvl="0" indent="-298450" algn="l" rtl="0">
-              <a:lnSpc>
-                <a:spcPct val="115000"/>
-              </a:lnSpc>
-              <a:spcBef>
-                <a:spcPts val="1000"/>
-              </a:spcBef>
-              <a:spcAft>
-                <a:spcPts val="0"/>
-              </a:spcAft>
-              <a:buClr>
-                <a:srgbClr val="000000"/>
-              </a:buClr>
-              <a:buSzPts val="1100"/>
-              <a:buAutoNum type="arabicPeriod"/>
-            </a:pPr>
-            <a:r>
-              <a:rPr lang="en" sz="1100">
-                <a:solidFill>
-                  <a:srgbClr val="000000"/>
-                </a:solidFill>
-              </a:rPr>
-              <a:t>It should be possible to store simulation models and results in a file or database, and -load previously stored models and results from that file or database.</a:t>
-            </a:r>
-            <a:endParaRPr sz="1100">
-              <a:solidFill>
-                <a:srgbClr val="000000"/>
-              </a:solidFill>
-            </a:endParaRPr>
+            <a:endParaRPr lang="en-US" dirty="0"/>
           </a:p>
           <a:p>
             <a:pPr marL="0" lvl="0" indent="0" algn="l" rtl="0">
@@ -10611,7 +10525,7 @@
               </a:spcAft>
               <a:buNone/>
             </a:pPr>
-            <a:endParaRPr/>
+            <a:endParaRPr dirty="0"/>
           </a:p>
         </p:txBody>
       </p:sp>
@@ -10623,198 +10537,7 @@
 </p:sld>
 </file>
 
-<file path=ppt/slides/slide4.xml><?xml version="1.0" encoding="utf-8"?>
-<p:sld xmlns:a="http://schemas.openxmlformats.org/drawingml/2006/main" xmlns:r="http://schemas.openxmlformats.org/officeDocument/2006/relationships" xmlns:p="http://schemas.openxmlformats.org/presentationml/2006/main">
-  <p:cSld>
-    <p:spTree>
-      <p:nvGrpSpPr>
-        <p:cNvPr id="1" name="Shape 145"/>
-        <p:cNvGrpSpPr/>
-        <p:nvPr/>
-      </p:nvGrpSpPr>
-      <p:grpSpPr>
-        <a:xfrm>
-          <a:off x="0" y="0"/>
-          <a:ext cx="0" cy="0"/>
-          <a:chOff x="0" y="0"/>
-          <a:chExt cx="0" cy="0"/>
-        </a:xfrm>
-      </p:grpSpPr>
-      <p:sp>
-        <p:nvSpPr>
-          <p:cNvPr id="146" name="Google Shape;146;p16"/>
-          <p:cNvSpPr txBox="1">
-            <a:spLocks noGrp="1"/>
-          </p:cNvSpPr>
-          <p:nvPr>
-            <p:ph type="title"/>
-          </p:nvPr>
-        </p:nvSpPr>
-        <p:spPr>
-          <a:xfrm>
-            <a:off x="819150" y="866650"/>
-            <a:ext cx="7505700" cy="954600"/>
-          </a:xfrm>
-          <a:prstGeom prst="rect">
-            <a:avLst/>
-          </a:prstGeom>
-        </p:spPr>
-        <p:txBody>
-          <a:bodyPr spcFirstLastPara="1" wrap="square" lIns="91425" tIns="91425" rIns="91425" bIns="91425" anchor="t" anchorCtr="0">
-            <a:noAutofit/>
-          </a:bodyPr>
-          <a:lstStyle/>
-          <a:p>
-            <a:pPr marL="0" lvl="0" indent="0" algn="ctr" rtl="0">
-              <a:lnSpc>
-                <a:spcPct val="115000"/>
-              </a:lnSpc>
-              <a:spcBef>
-                <a:spcPts val="1000"/>
-              </a:spcBef>
-              <a:spcAft>
-                <a:spcPts val="0"/>
-              </a:spcAft>
-              <a:buNone/>
-            </a:pPr>
-            <a:r>
-              <a:rPr lang="en" sz="2400" b="1">
-                <a:solidFill>
-                  <a:srgbClr val="5B9BD5"/>
-                </a:solidFill>
-                <a:latin typeface="Calibri"/>
-                <a:ea typeface="Calibri"/>
-                <a:cs typeface="Calibri"/>
-                <a:sym typeface="Calibri"/>
-              </a:rPr>
-              <a:t> Deliverables </a:t>
-            </a:r>
-            <a:endParaRPr sz="2400" b="1"/>
-          </a:p>
-        </p:txBody>
-      </p:sp>
-      <p:sp>
-        <p:nvSpPr>
-          <p:cNvPr id="147" name="Google Shape;147;p16"/>
-          <p:cNvSpPr txBox="1">
-            <a:spLocks noGrp="1"/>
-          </p:cNvSpPr>
-          <p:nvPr>
-            <p:ph type="body" idx="1"/>
-          </p:nvPr>
-        </p:nvSpPr>
-        <p:spPr>
-          <a:xfrm>
-            <a:off x="819150" y="1747500"/>
-            <a:ext cx="7505700" cy="1648500"/>
-          </a:xfrm>
-          <a:prstGeom prst="rect">
-            <a:avLst/>
-          </a:prstGeom>
-        </p:spPr>
-        <p:txBody>
-          <a:bodyPr spcFirstLastPara="1" wrap="square" lIns="91425" tIns="91425" rIns="91425" bIns="91425" anchor="t" anchorCtr="0">
-            <a:noAutofit/>
-          </a:bodyPr>
-          <a:lstStyle/>
-          <a:p>
-            <a:pPr marL="0" lvl="0" indent="0" algn="ctr" rtl="0">
-              <a:lnSpc>
-                <a:spcPct val="115000"/>
-              </a:lnSpc>
-              <a:spcBef>
-                <a:spcPts val="1000"/>
-              </a:spcBef>
-              <a:spcAft>
-                <a:spcPts val="0"/>
-              </a:spcAft>
-              <a:buNone/>
-            </a:pPr>
-            <a:r>
-              <a:rPr lang="en" sz="1800">
-                <a:solidFill>
-                  <a:srgbClr val="5B9BD5"/>
-                </a:solidFill>
-              </a:rPr>
-              <a:t>At the end of this project we are expected to deliver</a:t>
-            </a:r>
-            <a:endParaRPr sz="1800">
-              <a:solidFill>
-                <a:srgbClr val="5B9BD5"/>
-              </a:solidFill>
-            </a:endParaRPr>
-          </a:p>
-          <a:p>
-            <a:pPr marL="228600" lvl="0" indent="-298450" algn="l" rtl="0">
-              <a:lnSpc>
-                <a:spcPct val="115000"/>
-              </a:lnSpc>
-              <a:spcBef>
-                <a:spcPts val="0"/>
-              </a:spcBef>
-              <a:spcAft>
-                <a:spcPts val="0"/>
-              </a:spcAft>
-              <a:buClr>
-                <a:srgbClr val="000000"/>
-              </a:buClr>
-              <a:buSzPts val="1100"/>
-              <a:buFont typeface="Noto Sans Symbols"/>
-              <a:buChar char="●"/>
-            </a:pPr>
-            <a:r>
-              <a:rPr lang="en" sz="1100">
-                <a:solidFill>
-                  <a:srgbClr val="000000"/>
-                </a:solidFill>
-              </a:rPr>
-              <a:t>A working application (simulation software) in accordance with the project goals</a:t>
-            </a:r>
-            <a:endParaRPr sz="1100">
-              <a:solidFill>
-                <a:srgbClr val="000000"/>
-              </a:solidFill>
-            </a:endParaRPr>
-          </a:p>
-          <a:p>
-            <a:pPr marL="228600" lvl="0" indent="-298450" algn="l" rtl="0">
-              <a:lnSpc>
-                <a:spcPct val="115000"/>
-              </a:lnSpc>
-              <a:spcBef>
-                <a:spcPts val="1000"/>
-              </a:spcBef>
-              <a:spcAft>
-                <a:spcPts val="1000"/>
-              </a:spcAft>
-              <a:buClr>
-                <a:srgbClr val="000000"/>
-              </a:buClr>
-              <a:buSzPts val="1100"/>
-              <a:buFont typeface="Noto Sans Symbols"/>
-              <a:buChar char="●"/>
-            </a:pPr>
-            <a:r>
-              <a:rPr lang="en" sz="1100">
-                <a:solidFill>
-                  <a:srgbClr val="000000"/>
-                </a:solidFill>
-              </a:rPr>
-              <a:t>Documents that contains information about the requirements, the design of the system and the process.</a:t>
-            </a:r>
-            <a:endParaRPr/>
-          </a:p>
-        </p:txBody>
-      </p:sp>
-    </p:spTree>
-  </p:cSld>
-  <p:clrMapOvr>
-    <a:masterClrMapping/>
-  </p:clrMapOvr>
-</p:sld>
-</file>
-
-<file path=ppt/slides/slide5.xml><?xml version="1.0" encoding="utf-8"?>
+<file path=ppt/slides/slide6.xml><?xml version="1.0" encoding="utf-8"?>
 <p:sld xmlns:a="http://schemas.openxmlformats.org/drawingml/2006/main" xmlns:r="http://schemas.openxmlformats.org/officeDocument/2006/relationships" xmlns:p="http://schemas.openxmlformats.org/presentationml/2006/main">
   <p:cSld>
     <p:spTree>
@@ -10871,10 +10594,10 @@
               <a:buNone/>
             </a:pPr>
             <a:r>
-              <a:rPr lang="en"/>
+              <a:rPr lang="en" dirty="0"/>
               <a:t>Our process so far </a:t>
             </a:r>
-            <a:endParaRPr/>
+            <a:endParaRPr dirty="0"/>
           </a:p>
           <a:p>
             <a:pPr marL="0" lvl="0" indent="0" algn="l" rtl="0">
@@ -10886,7 +10609,7 @@
               </a:spcAft>
               <a:buNone/>
             </a:pPr>
-            <a:endParaRPr/>
+            <a:endParaRPr dirty="0"/>
           </a:p>
         </p:txBody>
       </p:sp>
@@ -10989,139 +10712,13 @@
   <p:clrMapOvr>
     <a:masterClrMapping/>
   </p:clrMapOvr>
-</p:sld>
-</file>
-
-<file path=ppt/slides/slide6.xml><?xml version="1.0" encoding="utf-8"?>
-<p:sld xmlns:a="http://schemas.openxmlformats.org/drawingml/2006/main" xmlns:r="http://schemas.openxmlformats.org/officeDocument/2006/relationships" xmlns:p="http://schemas.openxmlformats.org/presentationml/2006/main">
-  <p:cSld>
-    <p:spTree>
-      <p:nvGrpSpPr>
-        <p:cNvPr id="1" name="Shape 158"/>
-        <p:cNvGrpSpPr/>
-        <p:nvPr/>
-      </p:nvGrpSpPr>
-      <p:grpSpPr>
-        <a:xfrm>
-          <a:off x="0" y="0"/>
-          <a:ext cx="0" cy="0"/>
-          <a:chOff x="0" y="0"/>
-          <a:chExt cx="0" cy="0"/>
-        </a:xfrm>
-      </p:grpSpPr>
-      <p:sp>
-        <p:nvSpPr>
-          <p:cNvPr id="159" name="Google Shape;159;p18"/>
-          <p:cNvSpPr txBox="1">
-            <a:spLocks noGrp="1"/>
-          </p:cNvSpPr>
-          <p:nvPr>
-            <p:ph type="title"/>
-          </p:nvPr>
-        </p:nvSpPr>
-        <p:spPr>
-          <a:xfrm>
-            <a:off x="819150" y="845600"/>
-            <a:ext cx="7505700" cy="954600"/>
-          </a:xfrm>
-          <a:prstGeom prst="rect">
-            <a:avLst/>
-          </a:prstGeom>
-        </p:spPr>
-        <p:txBody>
-          <a:bodyPr spcFirstLastPara="1" wrap="square" lIns="91425" tIns="91425" rIns="91425" bIns="91425" anchor="t" anchorCtr="0">
-            <a:noAutofit/>
-          </a:bodyPr>
-          <a:lstStyle/>
-          <a:p>
-            <a:pPr marL="0" lvl="0" indent="0" algn="l" rtl="0">
-              <a:spcBef>
-                <a:spcPts val="0"/>
-              </a:spcBef>
-              <a:spcAft>
-                <a:spcPts val="0"/>
-              </a:spcAft>
-              <a:buNone/>
-            </a:pPr>
-            <a:r>
-              <a:rPr lang="en"/>
-              <a:t>Class description</a:t>
-            </a:r>
-            <a:endParaRPr/>
-          </a:p>
-        </p:txBody>
-      </p:sp>
-      <p:sp>
-        <p:nvSpPr>
-          <p:cNvPr id="160" name="Google Shape;160;p18"/>
-          <p:cNvSpPr txBox="1">
-            <a:spLocks noGrp="1"/>
-          </p:cNvSpPr>
-          <p:nvPr>
-            <p:ph type="body" idx="1"/>
-          </p:nvPr>
-        </p:nvSpPr>
-        <p:spPr>
-          <a:xfrm>
-            <a:off x="819150" y="1990725"/>
-            <a:ext cx="7505700" cy="2448000"/>
-          </a:xfrm>
-          <a:prstGeom prst="rect">
-            <a:avLst/>
-          </a:prstGeom>
-        </p:spPr>
-        <p:txBody>
-          <a:bodyPr spcFirstLastPara="1" wrap="square" lIns="91425" tIns="91425" rIns="91425" bIns="91425" anchor="t" anchorCtr="0">
-            <a:noAutofit/>
-          </a:bodyPr>
-          <a:lstStyle/>
-          <a:p>
-            <a:pPr marL="0" lvl="0" indent="0" algn="l" rtl="0">
-              <a:spcBef>
-                <a:spcPts val="0"/>
-              </a:spcBef>
-              <a:spcAft>
-                <a:spcPts val="0"/>
-              </a:spcAft>
-              <a:buNone/>
-            </a:pPr>
-            <a:r>
-              <a:rPr lang="en"/>
-              <a:t>Classes and their description</a:t>
-            </a:r>
-            <a:endParaRPr/>
-          </a:p>
-          <a:p>
-            <a:pPr marL="0" lvl="0" indent="0" algn="l" rtl="0">
-              <a:spcBef>
-                <a:spcPts val="1600"/>
-              </a:spcBef>
-              <a:spcAft>
-                <a:spcPts val="0"/>
-              </a:spcAft>
-              <a:buNone/>
-            </a:pPr>
-            <a:endParaRPr/>
-          </a:p>
-          <a:p>
-            <a:pPr marL="0" lvl="0" indent="0" algn="l" rtl="0">
-              <a:spcBef>
-                <a:spcPts val="1600"/>
-              </a:spcBef>
-              <a:spcAft>
-                <a:spcPts val="1600"/>
-              </a:spcAft>
-              <a:buNone/>
-            </a:pPr>
-            <a:endParaRPr/>
-          </a:p>
-        </p:txBody>
-      </p:sp>
-    </p:spTree>
-  </p:cSld>
-  <p:clrMapOvr>
-    <a:masterClrMapping/>
-  </p:clrMapOvr>
+  <p:timing>
+    <p:tnLst>
+      <p:par>
+        <p:cTn id="1" dur="indefinite" restart="never" nodeType="tmRoot"/>
+      </p:par>
+    </p:tnLst>
+  </p:timing>
 </p:sld>
 </file>
 
@@ -11177,8 +10774,8 @@
               <a:buNone/>
             </a:pPr>
             <a:r>
-              <a:rPr lang="en" dirty="0"/>
-              <a:t>First prototype</a:t>
+              <a:rPr lang="en" dirty="0" smtClean="0"/>
+              <a:t>Proof of concepts</a:t>
             </a:r>
             <a:endParaRPr dirty="0"/>
           </a:p>
@@ -11289,6 +10886,13 @@
   <p:clrMapOvr>
     <a:masterClrMapping/>
   </p:clrMapOvr>
+  <p:timing>
+    <p:tnLst>
+      <p:par>
+        <p:cTn id="1" dur="indefinite" restart="never" nodeType="tmRoot"/>
+      </p:par>
+    </p:tnLst>
+  </p:timing>
 </p:sld>
 </file>
 
@@ -11344,10 +10948,10 @@
               <a:buNone/>
             </a:pPr>
             <a:r>
-              <a:rPr lang="en"/>
+              <a:rPr lang="en" dirty="0"/>
               <a:t>Our plans for the remaining weeks</a:t>
             </a:r>
-            <a:endParaRPr/>
+            <a:endParaRPr dirty="0"/>
           </a:p>
         </p:txBody>
       </p:sp>
@@ -11414,6 +11018,13 @@
   <p:clrMapOvr>
     <a:masterClrMapping/>
   </p:clrMapOvr>
+  <p:timing>
+    <p:tnLst>
+      <p:par>
+        <p:cTn id="1" dur="indefinite" restart="never" nodeType="tmRoot"/>
+      </p:par>
+    </p:tnLst>
+  </p:timing>
 </p:sld>
 </file>
 
@@ -11472,7 +11083,7 @@
               <a:buNone/>
             </a:pPr>
             <a:r>
-              <a:rPr lang="en" sz="3600">
+              <a:rPr lang="en" sz="3600" dirty="0">
                 <a:solidFill>
                   <a:schemeClr val="dk2"/>
                 </a:solidFill>
@@ -11483,7 +11094,7 @@
               </a:rPr>
               <a:t>Conclusion</a:t>
             </a:r>
-            <a:endParaRPr sz="3600"/>
+            <a:endParaRPr sz="3600" dirty="0"/>
           </a:p>
         </p:txBody>
       </p:sp>
@@ -11512,7 +11123,7 @@
           </a:bodyPr>
           <a:lstStyle/>
           <a:p>
-            <a:pPr marL="0" lvl="0" indent="0" algn="l" rtl="0">
+            <a:pPr marL="0" lvl="0" indent="0" algn="ctr" rtl="0">
               <a:spcBef>
                 <a:spcPts val="0"/>
               </a:spcBef>
@@ -11522,10 +11133,10 @@
               <a:buNone/>
             </a:pPr>
             <a:r>
-              <a:rPr lang="en"/>
-              <a:t>Conclusion</a:t>
+              <a:rPr lang="en-US" sz="2000" dirty="0" smtClean="0"/>
+              <a:t>Thanks you for your kind attention</a:t>
             </a:r>
-            <a:endParaRPr/>
+            <a:endParaRPr sz="2000" dirty="0"/>
           </a:p>
         </p:txBody>
       </p:sp>

</xml_diff>